<commit_message>
traductor de la papa
</commit_message>
<xml_diff>
--- a/hacking 8x8 fonts.pptx
+++ b/hacking 8x8 fonts.pptx
@@ -270,7 +270,7 @@
           <a:p>
             <a:fld id="{8B631C57-D408-41F5-A34D-FF31DEC00263}" type="datetimeFigureOut">
               <a:rPr lang="es-CL" smtClean="0"/>
-              <a:t>05-10-2023</a:t>
+              <a:t>10-05-2024</a:t>
             </a:fld>
             <a:endParaRPr lang="es-CL"/>
           </a:p>
@@ -470,7 +470,7 @@
           <a:p>
             <a:fld id="{8B631C57-D408-41F5-A34D-FF31DEC00263}" type="datetimeFigureOut">
               <a:rPr lang="es-CL" smtClean="0"/>
-              <a:t>05-10-2023</a:t>
+              <a:t>10-05-2024</a:t>
             </a:fld>
             <a:endParaRPr lang="es-CL"/>
           </a:p>
@@ -680,7 +680,7 @@
           <a:p>
             <a:fld id="{8B631C57-D408-41F5-A34D-FF31DEC00263}" type="datetimeFigureOut">
               <a:rPr lang="es-CL" smtClean="0"/>
-              <a:t>05-10-2023</a:t>
+              <a:t>10-05-2024</a:t>
             </a:fld>
             <a:endParaRPr lang="es-CL"/>
           </a:p>
@@ -880,7 +880,7 @@
           <a:p>
             <a:fld id="{8B631C57-D408-41F5-A34D-FF31DEC00263}" type="datetimeFigureOut">
               <a:rPr lang="es-CL" smtClean="0"/>
-              <a:t>05-10-2023</a:t>
+              <a:t>10-05-2024</a:t>
             </a:fld>
             <a:endParaRPr lang="es-CL"/>
           </a:p>
@@ -1156,7 +1156,7 @@
           <a:p>
             <a:fld id="{8B631C57-D408-41F5-A34D-FF31DEC00263}" type="datetimeFigureOut">
               <a:rPr lang="es-CL" smtClean="0"/>
-              <a:t>05-10-2023</a:t>
+              <a:t>10-05-2024</a:t>
             </a:fld>
             <a:endParaRPr lang="es-CL"/>
           </a:p>
@@ -1424,7 +1424,7 @@
           <a:p>
             <a:fld id="{8B631C57-D408-41F5-A34D-FF31DEC00263}" type="datetimeFigureOut">
               <a:rPr lang="es-CL" smtClean="0"/>
-              <a:t>05-10-2023</a:t>
+              <a:t>10-05-2024</a:t>
             </a:fld>
             <a:endParaRPr lang="es-CL"/>
           </a:p>
@@ -1839,7 +1839,7 @@
           <a:p>
             <a:fld id="{8B631C57-D408-41F5-A34D-FF31DEC00263}" type="datetimeFigureOut">
               <a:rPr lang="es-CL" smtClean="0"/>
-              <a:t>05-10-2023</a:t>
+              <a:t>10-05-2024</a:t>
             </a:fld>
             <a:endParaRPr lang="es-CL"/>
           </a:p>
@@ -1981,7 +1981,7 @@
           <a:p>
             <a:fld id="{8B631C57-D408-41F5-A34D-FF31DEC00263}" type="datetimeFigureOut">
               <a:rPr lang="es-CL" smtClean="0"/>
-              <a:t>05-10-2023</a:t>
+              <a:t>10-05-2024</a:t>
             </a:fld>
             <a:endParaRPr lang="es-CL"/>
           </a:p>
@@ -2094,7 +2094,7 @@
           <a:p>
             <a:fld id="{8B631C57-D408-41F5-A34D-FF31DEC00263}" type="datetimeFigureOut">
               <a:rPr lang="es-CL" smtClean="0"/>
-              <a:t>05-10-2023</a:t>
+              <a:t>10-05-2024</a:t>
             </a:fld>
             <a:endParaRPr lang="es-CL"/>
           </a:p>
@@ -2407,7 +2407,7 @@
           <a:p>
             <a:fld id="{8B631C57-D408-41F5-A34D-FF31DEC00263}" type="datetimeFigureOut">
               <a:rPr lang="es-CL" smtClean="0"/>
-              <a:t>05-10-2023</a:t>
+              <a:t>10-05-2024</a:t>
             </a:fld>
             <a:endParaRPr lang="es-CL"/>
           </a:p>
@@ -2696,7 +2696,7 @@
           <a:p>
             <a:fld id="{8B631C57-D408-41F5-A34D-FF31DEC00263}" type="datetimeFigureOut">
               <a:rPr lang="es-CL" smtClean="0"/>
-              <a:t>05-10-2023</a:t>
+              <a:t>10-05-2024</a:t>
             </a:fld>
             <a:endParaRPr lang="es-CL"/>
           </a:p>
@@ -2939,7 +2939,7 @@
           <a:p>
             <a:fld id="{8B631C57-D408-41F5-A34D-FF31DEC00263}" type="datetimeFigureOut">
               <a:rPr lang="es-CL" smtClean="0"/>
-              <a:t>05-10-2023</a:t>
+              <a:t>10-05-2024</a:t>
             </a:fld>
             <a:endParaRPr lang="es-CL"/>
           </a:p>
@@ -3371,7 +3371,7 @@
           <p:nvPr>
             <p:extLst>
               <p:ext uri="{D42A27DB-BD31-4B8C-83A1-F6EECF244321}">
-                <p14:modId xmlns:p14="http://schemas.microsoft.com/office/powerpoint/2010/main" val="3903556623"/>
+                <p14:modId xmlns:p14="http://schemas.microsoft.com/office/powerpoint/2010/main" val="3262230946"/>
               </p:ext>
             </p:extLst>
           </p:nvPr>
@@ -3579,7 +3579,7 @@
                     <a:bodyPr/>
                     <a:lstStyle/>
                     <a:p>
-                      <a:endParaRPr lang="es-CL"/>
+                      <a:endParaRPr lang="es-CL" dirty="0"/>
                     </a:p>
                   </a:txBody>
                   <a:tcPr>
@@ -3687,7 +3687,7 @@
                     <a:bodyPr/>
                     <a:lstStyle/>
                     <a:p>
-                      <a:endParaRPr lang="es-CL"/>
+                      <a:endParaRPr lang="es-CL" dirty="0"/>
                     </a:p>
                   </a:txBody>
                   <a:tcPr>
@@ -3822,7 +3822,7 @@
                     <a:bodyPr/>
                     <a:lstStyle/>
                     <a:p>
-                      <a:endParaRPr lang="es-CL"/>
+                      <a:endParaRPr lang="es-CL" dirty="0"/>
                     </a:p>
                   </a:txBody>
                   <a:tcPr>
@@ -3845,7 +3845,7 @@
                     <a:bodyPr/>
                     <a:lstStyle/>
                     <a:p>
-                      <a:endParaRPr lang="es-CL"/>
+                      <a:endParaRPr lang="es-CL" dirty="0"/>
                     </a:p>
                   </a:txBody>
                   <a:tcPr>
@@ -3951,7 +3951,7 @@
                     <a:bodyPr/>
                     <a:lstStyle/>
                     <a:p>
-                      <a:endParaRPr lang="es-CL"/>
+                      <a:endParaRPr lang="es-CL" dirty="0"/>
                     </a:p>
                   </a:txBody>
                   <a:tcPr>
@@ -4117,7 +4117,7 @@
                     <a:bodyPr/>
                     <a:lstStyle/>
                     <a:p>
-                      <a:endParaRPr lang="es-CL"/>
+                      <a:endParaRPr lang="es-CL" dirty="0"/>
                     </a:p>
                   </a:txBody>
                   <a:tcPr>
@@ -4177,7 +4177,7 @@
                     <a:bodyPr/>
                     <a:lstStyle/>
                     <a:p>
-                      <a:endParaRPr lang="es-CL"/>
+                      <a:endParaRPr lang="es-CL" dirty="0"/>
                     </a:p>
                   </a:txBody>
                   <a:tcPr>
@@ -4209,7 +4209,7 @@
                     <a:bodyPr/>
                     <a:lstStyle/>
                     <a:p>
-                      <a:endParaRPr lang="es-CL"/>
+                      <a:endParaRPr lang="es-CL" dirty="0"/>
                     </a:p>
                   </a:txBody>
                   <a:tcPr>
@@ -4475,7 +4475,7 @@
                     <a:bodyPr/>
                     <a:lstStyle/>
                     <a:p>
-                      <a:endParaRPr lang="es-CL"/>
+                      <a:endParaRPr lang="es-CL" dirty="0"/>
                     </a:p>
                   </a:txBody>
                   <a:tcPr>
@@ -5106,6 +5106,36 @@
           <a:xfrm>
             <a:off x="3700279" y="2619668"/>
             <a:ext cx="783115" cy="1227435"/>
+          </a:xfrm>
+          <a:prstGeom prst="rect">
+            <a:avLst/>
+          </a:prstGeom>
+        </p:spPr>
+      </p:pic>
+      <p:pic>
+        <p:nvPicPr>
+          <p:cNvPr id="8" name="Imagen 7">
+            <a:extLst>
+              <a:ext uri="{FF2B5EF4-FFF2-40B4-BE49-F238E27FC236}">
+                <a16:creationId xmlns:a16="http://schemas.microsoft.com/office/drawing/2014/main" id="{C7E20221-B20D-3C13-70C5-03C8C61035FF}"/>
+              </a:ext>
+            </a:extLst>
+          </p:cNvPr>
+          <p:cNvPicPr>
+            <a:picLocks noChangeAspect="1"/>
+          </p:cNvPicPr>
+          <p:nvPr/>
+        </p:nvPicPr>
+        <p:blipFill>
+          <a:blip r:embed="rId8"/>
+          <a:stretch>
+            <a:fillRect/>
+          </a:stretch>
+        </p:blipFill>
+        <p:spPr>
+          <a:xfrm>
+            <a:off x="2654678" y="4152376"/>
+            <a:ext cx="3238952" cy="1314633"/>
           </a:xfrm>
           <a:prstGeom prst="rect">
             <a:avLst/>
@@ -5660,6 +5690,226 @@
           <a:chExt cx="0" cy="0"/>
         </a:xfrm>
       </p:grpSpPr>
+      <p:pic>
+        <p:nvPicPr>
+          <p:cNvPr id="3" name="Imagen 2">
+            <a:extLst>
+              <a:ext uri="{FF2B5EF4-FFF2-40B4-BE49-F238E27FC236}">
+                <a16:creationId xmlns:a16="http://schemas.microsoft.com/office/drawing/2014/main" id="{86B67056-19DE-5D30-7453-794FA1B72BD5}"/>
+              </a:ext>
+            </a:extLst>
+          </p:cNvPr>
+          <p:cNvPicPr>
+            <a:picLocks noChangeAspect="1"/>
+          </p:cNvPicPr>
+          <p:nvPr/>
+        </p:nvPicPr>
+        <p:blipFill>
+          <a:blip r:embed="rId2"/>
+          <a:stretch>
+            <a:fillRect/>
+          </a:stretch>
+        </p:blipFill>
+        <p:spPr>
+          <a:xfrm>
+            <a:off x="322630" y="816403"/>
+            <a:ext cx="6914569" cy="2976173"/>
+          </a:xfrm>
+          <a:prstGeom prst="rect">
+            <a:avLst/>
+          </a:prstGeom>
+        </p:spPr>
+      </p:pic>
+      <p:pic>
+        <p:nvPicPr>
+          <p:cNvPr id="5" name="Imagen 4">
+            <a:extLst>
+              <a:ext uri="{FF2B5EF4-FFF2-40B4-BE49-F238E27FC236}">
+                <a16:creationId xmlns:a16="http://schemas.microsoft.com/office/drawing/2014/main" id="{4016FE3A-540C-6BA7-0859-CB61FA572ECC}"/>
+              </a:ext>
+            </a:extLst>
+          </p:cNvPr>
+          <p:cNvPicPr>
+            <a:picLocks noChangeAspect="1"/>
+          </p:cNvPicPr>
+          <p:nvPr/>
+        </p:nvPicPr>
+        <p:blipFill>
+          <a:blip r:embed="rId3"/>
+          <a:stretch>
+            <a:fillRect/>
+          </a:stretch>
+        </p:blipFill>
+        <p:spPr>
+          <a:xfrm>
+            <a:off x="6247570" y="504012"/>
+            <a:ext cx="5944430" cy="3600953"/>
+          </a:xfrm>
+          <a:prstGeom prst="rect">
+            <a:avLst/>
+          </a:prstGeom>
+        </p:spPr>
+      </p:pic>
+      <p:sp>
+        <p:nvSpPr>
+          <p:cNvPr id="7" name="CuadroTexto 6">
+            <a:extLst>
+              <a:ext uri="{FF2B5EF4-FFF2-40B4-BE49-F238E27FC236}">
+                <a16:creationId xmlns:a16="http://schemas.microsoft.com/office/drawing/2014/main" id="{22B30A6B-BFDB-DDF3-5ACB-548D634E4AAF}"/>
+              </a:ext>
+            </a:extLst>
+          </p:cNvPr>
+          <p:cNvSpPr txBox="1"/>
+          <p:nvPr/>
+        </p:nvSpPr>
+        <p:spPr>
+          <a:xfrm>
+            <a:off x="792050" y="4250029"/>
+            <a:ext cx="10567115" cy="1200329"/>
+          </a:xfrm>
+          <a:prstGeom prst="rect">
+            <a:avLst/>
+          </a:prstGeom>
+          <a:noFill/>
+        </p:spPr>
+        <p:txBody>
+          <a:bodyPr wrap="square" rtlCol="0">
+            <a:spAutoFit/>
+          </a:bodyPr>
+          <a:lstStyle/>
+          <a:p>
+            <a:r>
+              <a:rPr lang="es-MX" dirty="0"/>
+              <a:t>(</a:t>
+            </a:r>
+            <a:r>
+              <a:rPr lang="es-MX" dirty="0" err="1"/>
+              <a:t>number</a:t>
+            </a:r>
+            <a:r>
+              <a:rPr lang="es-MX" dirty="0"/>
+              <a:t>).</a:t>
+            </a:r>
+            <a:r>
+              <a:rPr lang="es-MX" dirty="0" err="1"/>
+              <a:t>toString</a:t>
+            </a:r>
+            <a:r>
+              <a:rPr lang="es-MX" dirty="0"/>
+              <a:t>(base) </a:t>
+            </a:r>
+            <a:r>
+              <a:rPr lang="es-MX" dirty="0">
+                <a:sym typeface="Wingdings" panose="05000000000000000000" pitchFamily="2" charset="2"/>
+              </a:rPr>
+              <a:t> convierte el numero a cadena de texto en base base…base dos máximo 1,2</a:t>
+            </a:r>
+          </a:p>
+          <a:p>
+            <a:r>
+              <a:rPr lang="es-MX" dirty="0">
+                <a:sym typeface="Wingdings" panose="05000000000000000000" pitchFamily="2" charset="2"/>
+              </a:rPr>
+              <a:t>Base 3: 0,1,2  base 16  0,1,2,3,…</a:t>
+            </a:r>
+            <a:r>
+              <a:rPr lang="es-MX" dirty="0" err="1">
+                <a:sym typeface="Wingdings" panose="05000000000000000000" pitchFamily="2" charset="2"/>
+              </a:rPr>
+              <a:t>a,b,c,d,e,f</a:t>
+            </a:r>
+            <a:r>
+              <a:rPr lang="es-MX" dirty="0">
+                <a:sym typeface="Wingdings" panose="05000000000000000000" pitchFamily="2" charset="2"/>
+              </a:rPr>
+              <a:t>  base 17  0,1,2,3,….</a:t>
+            </a:r>
+            <a:r>
+              <a:rPr lang="es-MX" dirty="0" err="1">
+                <a:sym typeface="Wingdings" panose="05000000000000000000" pitchFamily="2" charset="2"/>
+              </a:rPr>
+              <a:t>e,f,g</a:t>
+            </a:r>
+            <a:r>
+              <a:rPr lang="es-MX" dirty="0">
+                <a:sym typeface="Wingdings" panose="05000000000000000000" pitchFamily="2" charset="2"/>
+              </a:rPr>
+              <a:t>   </a:t>
+            </a:r>
+            <a:r>
+              <a:rPr lang="es-MX" dirty="0" err="1">
+                <a:sym typeface="Wingdings" panose="05000000000000000000" pitchFamily="2" charset="2"/>
+              </a:rPr>
+              <a:t>etc</a:t>
+            </a:r>
+            <a:endParaRPr lang="es-MX" dirty="0">
+              <a:sym typeface="Wingdings" panose="05000000000000000000" pitchFamily="2" charset="2"/>
+            </a:endParaRPr>
+          </a:p>
+          <a:p>
+            <a:endParaRPr lang="es-MX" dirty="0">
+              <a:sym typeface="Wingdings" panose="05000000000000000000" pitchFamily="2" charset="2"/>
+            </a:endParaRPr>
+          </a:p>
+          <a:p>
+            <a:r>
+              <a:rPr lang="es-MX" dirty="0" err="1">
+                <a:sym typeface="Wingdings" panose="05000000000000000000" pitchFamily="2" charset="2"/>
+              </a:rPr>
+              <a:t>parseInt</a:t>
+            </a:r>
+            <a:r>
+              <a:rPr lang="es-MX" dirty="0">
+                <a:sym typeface="Wingdings" panose="05000000000000000000" pitchFamily="2" charset="2"/>
+              </a:rPr>
+              <a:t>(</a:t>
+            </a:r>
+            <a:r>
+              <a:rPr lang="es-MX" dirty="0" err="1">
+                <a:sym typeface="Wingdings" panose="05000000000000000000" pitchFamily="2" charset="2"/>
+              </a:rPr>
+              <a:t>base_string</a:t>
+            </a:r>
+            <a:r>
+              <a:rPr lang="es-MX" dirty="0">
+                <a:sym typeface="Wingdings" panose="05000000000000000000" pitchFamily="2" charset="2"/>
+              </a:rPr>
+              <a:t>, base)</a:t>
+            </a:r>
+            <a:endParaRPr lang="es-CL" dirty="0"/>
+          </a:p>
+        </p:txBody>
+      </p:sp>
+      <p:pic>
+        <p:nvPicPr>
+          <p:cNvPr id="10" name="Imagen 9">
+            <a:extLst>
+              <a:ext uri="{FF2B5EF4-FFF2-40B4-BE49-F238E27FC236}">
+                <a16:creationId xmlns:a16="http://schemas.microsoft.com/office/drawing/2014/main" id="{5A19C8B9-3923-9BAE-6776-BF983CB675C0}"/>
+              </a:ext>
+            </a:extLst>
+          </p:cNvPr>
+          <p:cNvPicPr>
+            <a:picLocks noChangeAspect="1"/>
+          </p:cNvPicPr>
+          <p:nvPr/>
+        </p:nvPicPr>
+        <p:blipFill>
+          <a:blip r:embed="rId4"/>
+          <a:stretch>
+            <a:fillRect/>
+          </a:stretch>
+        </p:blipFill>
+        <p:spPr>
+          <a:xfrm>
+            <a:off x="8957256" y="607217"/>
+            <a:ext cx="2558603" cy="3237128"/>
+          </a:xfrm>
+          <a:prstGeom prst="rect">
+            <a:avLst/>
+          </a:prstGeom>
+        </p:spPr>
+      </p:pic>
     </p:spTree>
     <p:extLst>
       <p:ext uri="{BB962C8B-B14F-4D97-AF65-F5344CB8AC3E}">

</xml_diff>